<commit_message>
Posle drugog dana + Prisustvo
</commit_message>
<xml_diff>
--- a/JAVA.pptx
+++ b/JAVA.pptx
@@ -220,7 +220,7 @@
           <a:effectLst/>
           <a:extLst>
             <a:ext uri="{91240B29-F687-4f45-9708-019B960494DF}">
-              <a14:hiddenLine xmlns="" xmlns:a14="http://schemas.microsoft.com/office/drawing/2010/main" w="9525">
+              <a14:hiddenLine xmlns:a14="http://schemas.microsoft.com/office/drawing/2010/main" xmlns="" w="9525">
                 <a:solidFill>
                   <a:srgbClr val="000000"/>
                 </a:solidFill>
@@ -413,7 +413,7 @@
             <a:fld id="{08B9EBBA-996F-894A-B54A-D6246ED52CEA}" type="datetimeFigureOut">
               <a:rPr lang="en-US" dirty="0"/>
               <a:pPr/>
-              <a:t>11/11/2017</a:t>
+              <a:t>11/14/2017</a:t>
             </a:fld>
             <a:endParaRPr lang="en-US" dirty="0"/>
           </a:p>
@@ -728,7 +728,7 @@
             <a:fld id="{18C79C5D-2A6F-F04D-97DA-BEF2467B64E4}" type="datetimeFigureOut">
               <a:rPr lang="en-US" dirty="0"/>
               <a:pPr/>
-              <a:t>11/11/2017</a:t>
+              <a:t>11/14/2017</a:t>
             </a:fld>
             <a:endParaRPr lang="en-US" dirty="0"/>
           </a:p>
@@ -1213,7 +1213,7 @@
             <a:fld id="{8DFA1846-DA80-1C48-A609-854EA85C59AD}" type="datetimeFigureOut">
               <a:rPr lang="en-US" dirty="0"/>
               <a:pPr/>
-              <a:t>11/11/2017</a:t>
+              <a:t>11/14/2017</a:t>
             </a:fld>
             <a:endParaRPr lang="en-US" dirty="0"/>
           </a:p>
@@ -1579,7 +1579,7 @@
             <a:fld id="{FBF54567-0DE4-3F47-BF90-CB84690072F9}" type="datetimeFigureOut">
               <a:rPr lang="en-US" dirty="0"/>
               <a:pPr/>
-              <a:t>11/11/2017</a:t>
+              <a:t>11/14/2017</a:t>
             </a:fld>
             <a:endParaRPr lang="en-US" dirty="0"/>
           </a:p>
@@ -1730,7 +1730,7 @@
           <a:ln/>
           <a:extLst>
             <a:ext uri="{91240B29-F687-4f45-9708-019B960494DF}">
-              <a14:hiddenLine xmlns="" xmlns:a14="http://schemas.microsoft.com/office/drawing/2010/main" w="9525">
+              <a14:hiddenLine xmlns:a14="http://schemas.microsoft.com/office/drawing/2010/main" xmlns="" w="9525">
                 <a:solidFill>
                   <a:srgbClr val="000000"/>
                 </a:solidFill>
@@ -1849,7 +1849,7 @@
             <a:fld id="{C6C52C72-DE31-F449-A4ED-4C594FD91407}" type="datetimeFigureOut">
               <a:rPr lang="en-US" dirty="0"/>
               <a:pPr/>
-              <a:t>11/11/2017</a:t>
+              <a:t>11/14/2017</a:t>
             </a:fld>
             <a:endParaRPr lang="en-US" dirty="0"/>
           </a:p>
@@ -2002,7 +2002,7 @@
           <a:ln/>
           <a:extLst>
             <a:ext uri="{91240B29-F687-4f45-9708-019B960494DF}">
-              <a14:hiddenLine xmlns="" xmlns:a14="http://schemas.microsoft.com/office/drawing/2010/main" w="9525">
+              <a14:hiddenLine xmlns:a14="http://schemas.microsoft.com/office/drawing/2010/main" xmlns="" w="9525">
                 <a:solidFill>
                   <a:srgbClr val="000000"/>
                 </a:solidFill>
@@ -2131,7 +2131,7 @@
             <a:fld id="{ED62726E-379B-B349-9EED-81ED093FA806}" type="datetimeFigureOut">
               <a:rPr lang="en-US" dirty="0"/>
               <a:pPr/>
-              <a:t>11/11/2017</a:t>
+              <a:t>11/14/2017</a:t>
             </a:fld>
             <a:endParaRPr lang="en-US" dirty="0"/>
           </a:p>
@@ -2282,7 +2282,7 @@
           <a:ln/>
           <a:extLst>
             <a:ext uri="{91240B29-F687-4f45-9708-019B960494DF}">
-              <a14:hiddenLine xmlns="" xmlns:a14="http://schemas.microsoft.com/office/drawing/2010/main" w="9525">
+              <a14:hiddenLine xmlns:a14="http://schemas.microsoft.com/office/drawing/2010/main" xmlns="" w="9525">
                 <a:solidFill>
                   <a:srgbClr val="000000"/>
                 </a:solidFill>
@@ -2411,7 +2411,7 @@
             <a:fld id="{9B3A1323-8D79-1946-B0D7-40001CF92E9D}" type="datetimeFigureOut">
               <a:rPr lang="en-US" dirty="0"/>
               <a:pPr/>
-              <a:t>11/11/2017</a:t>
+              <a:t>11/14/2017</a:t>
             </a:fld>
             <a:endParaRPr lang="en-US" dirty="0"/>
           </a:p>
@@ -2751,7 +2751,7 @@
             <a:fld id="{8DFA1846-DA80-1C48-A609-854EA85C59AD}" type="datetimeFigureOut">
               <a:rPr lang="en-US" dirty="0"/>
               <a:pPr/>
-              <a:t>11/11/2017</a:t>
+              <a:t>11/14/2017</a:t>
             </a:fld>
             <a:endParaRPr lang="en-US" dirty="0"/>
           </a:p>
@@ -2902,7 +2902,7 @@
           <a:ln/>
           <a:extLst>
             <a:ext uri="{91240B29-F687-4f45-9708-019B960494DF}">
-              <a14:hiddenLine xmlns="" xmlns:a14="http://schemas.microsoft.com/office/drawing/2010/main" w="9525">
+              <a14:hiddenLine xmlns:a14="http://schemas.microsoft.com/office/drawing/2010/main" xmlns="" w="9525">
                 <a:solidFill>
                   <a:srgbClr val="000000"/>
                 </a:solidFill>
@@ -3087,7 +3087,7 @@
             <a:fld id="{57302355-E14B-8545-A8F8-0FE83CC9D524}" type="datetimeFigureOut">
               <a:rPr lang="en-US" dirty="0"/>
               <a:pPr/>
-              <a:t>11/11/2017</a:t>
+              <a:t>11/14/2017</a:t>
             </a:fld>
             <a:endParaRPr lang="en-US" dirty="0"/>
           </a:p>
@@ -3238,7 +3238,7 @@
           <a:ln/>
           <a:extLst>
             <a:ext uri="{91240B29-F687-4f45-9708-019B960494DF}">
-              <a14:hiddenLine xmlns="" xmlns:a14="http://schemas.microsoft.com/office/drawing/2010/main" w="9525">
+              <a14:hiddenLine xmlns:a14="http://schemas.microsoft.com/office/drawing/2010/main" xmlns="" w="9525">
                 <a:solidFill>
                   <a:srgbClr val="000000"/>
                 </a:solidFill>
@@ -3561,7 +3561,7 @@
             <a:fld id="{02640F58-564D-2B4F-AE67-E407BA4FCF45}" type="datetimeFigureOut">
               <a:rPr lang="en-US" dirty="0"/>
               <a:pPr/>
-              <a:t>11/11/2017</a:t>
+              <a:t>11/14/2017</a:t>
             </a:fld>
             <a:endParaRPr lang="en-US" dirty="0"/>
           </a:p>
@@ -3712,7 +3712,7 @@
           <a:ln/>
           <a:extLst>
             <a:ext uri="{91240B29-F687-4f45-9708-019B960494DF}">
-              <a14:hiddenLine xmlns="" xmlns:a14="http://schemas.microsoft.com/office/drawing/2010/main" w="9525">
+              <a14:hiddenLine xmlns:a14="http://schemas.microsoft.com/office/drawing/2010/main" xmlns="" w="9525">
                 <a:solidFill>
                   <a:srgbClr val="000000"/>
                 </a:solidFill>
@@ -3779,7 +3779,7 @@
             <a:fld id="{F13A34C8-038E-2045-AF43-DF7DBB8E0E9E}" type="datetimeFigureOut">
               <a:rPr lang="en-US" dirty="0"/>
               <a:pPr/>
-              <a:t>11/11/2017</a:t>
+              <a:t>11/14/2017</a:t>
             </a:fld>
             <a:endParaRPr lang="en-US" dirty="0"/>
           </a:p>
@@ -3871,7 +3871,7 @@
             <a:fld id="{8818C68F-D26B-8F47-958C-23B49CF8A634}" type="datetimeFigureOut">
               <a:rPr lang="en-US" dirty="0"/>
               <a:pPr/>
-              <a:t>11/11/2017</a:t>
+              <a:t>11/14/2017</a:t>
             </a:fld>
             <a:endParaRPr lang="en-US" dirty="0"/>
           </a:p>
@@ -4135,7 +4135,7 @@
           <a:ln/>
           <a:extLst>
             <a:ext uri="{91240B29-F687-4f45-9708-019B960494DF}">
-              <a14:hiddenLine xmlns="" xmlns:a14="http://schemas.microsoft.com/office/drawing/2010/main" w="9525">
+              <a14:hiddenLine xmlns:a14="http://schemas.microsoft.com/office/drawing/2010/main" xmlns="" w="9525">
                 <a:solidFill>
                   <a:srgbClr val="000000"/>
                 </a:solidFill>
@@ -4335,7 +4335,7 @@
             <a:fld id="{D0DF5E60-9974-AC48-9591-99C2BB44B7CF}" type="datetimeFigureOut">
               <a:rPr lang="en-US" dirty="0"/>
               <a:pPr/>
-              <a:t>11/11/2017</a:t>
+              <a:t>11/14/2017</a:t>
             </a:fld>
             <a:endParaRPr lang="en-US" dirty="0"/>
           </a:p>
@@ -4645,7 +4645,7 @@
             <a:fld id="{18C79C5D-2A6F-F04D-97DA-BEF2467B64E4}" type="datetimeFigureOut">
               <a:rPr lang="en-US" dirty="0"/>
               <a:pPr/>
-              <a:t>11/11/2017</a:t>
+              <a:t>11/14/2017</a:t>
             </a:fld>
             <a:endParaRPr lang="en-US" dirty="0"/>
           </a:p>
@@ -4912,7 +4912,7 @@
             <a:fld id="{09B482E8-6E0E-1B4F-B1FD-C69DB9E858D9}" type="datetimeFigureOut">
               <a:rPr lang="en-US" dirty="0"/>
               <a:pPr/>
-              <a:t>11/11/2017</a:t>
+              <a:t>11/14/2017</a:t>
             </a:fld>
             <a:endParaRPr lang="en-US" dirty="0"/>
           </a:p>

</xml_diff>